<commit_message>
diapositivas para el taller
</commit_message>
<xml_diff>
--- a/Presentacion/Taller.pptx
+++ b/Presentacion/Taller.pptx
@@ -7,9 +7,10 @@
   <p:sldIdLst>
     <p:sldId id="256" r:id="rId2"/>
     <p:sldId id="257" r:id="rId3"/>
-    <p:sldId id="258" r:id="rId4"/>
-    <p:sldId id="259" r:id="rId5"/>
-    <p:sldId id="260" r:id="rId6"/>
+    <p:sldId id="259" r:id="rId4"/>
+    <p:sldId id="258" r:id="rId5"/>
+    <p:sldId id="261" r:id="rId6"/>
+    <p:sldId id="260" r:id="rId7"/>
   </p:sldIdLst>
   <p:sldSz cx="12192000" cy="6858000"/>
   <p:notesSz cx="6858000" cy="9144000"/>
@@ -116,6 +117,171 @@
 </p:presentation>
 </file>
 
+<file path=ppt/revisionInfo.xml><?xml version="1.0" encoding="utf-8"?>
+<p1510:revInfo xmlns:a="http://schemas.openxmlformats.org/drawingml/2006/main" xmlns:r="http://schemas.openxmlformats.org/officeDocument/2006/relationships" xmlns:p1510="http://schemas.microsoft.com/office/powerpoint/2015/10/main">
+  <p1510:revLst>
+    <p1510:client id="{6C1BA623-70D9-46C5-ADD1-F2B18404CFA1}" v="326" dt="2021-03-07T00:34:53.512"/>
+    <p1510:client id="{9165F525-19EE-4A82-8DD3-28598AF808C0}" v="128" dt="2021-03-06T21:37:34.864"/>
+    <p1510:client id="{C864E01D-327D-4EE1-B8FE-68312D054438}" v="60" dt="2021-03-07T00:15:20.684"/>
+    <p1510:client id="{C869A228-EF32-4135-B8AB-C19EBEDB4AB8}" v="6" dt="2021-03-12T06:25:13.240"/>
+  </p1510:revLst>
+</p1510:revInfo>
+</file>
+
+<file path=ppt/changesInfos/changesInfo1.xml><?xml version="1.0" encoding="utf-8"?>
+<pc:chgInfo xmlns:a="http://schemas.openxmlformats.org/drawingml/2006/main" xmlns:r="http://schemas.openxmlformats.org/officeDocument/2006/relationships" xmlns:ac="http://schemas.microsoft.com/office/drawing/2013/main/command" xmlns:pc="http://schemas.microsoft.com/office/powerpoint/2013/main/command">
+  <pc:docChgLst>
+    <pc:chgData name="Martin Cruz Medinilla" userId="97fb9944e3b81560" providerId="Windows Live" clId="Web-{C869A228-EF32-4135-B8AB-C19EBEDB4AB8}"/>
+    <pc:docChg chg="modSld">
+      <pc:chgData name="Martin Cruz Medinilla" userId="97fb9944e3b81560" providerId="Windows Live" clId="Web-{C869A228-EF32-4135-B8AB-C19EBEDB4AB8}" dt="2021-03-12T06:25:10.475" v="1" actId="20577"/>
+      <pc:docMkLst>
+        <pc:docMk/>
+      </pc:docMkLst>
+      <pc:sldChg chg="modSp">
+        <pc:chgData name="Martin Cruz Medinilla" userId="97fb9944e3b81560" providerId="Windows Live" clId="Web-{C869A228-EF32-4135-B8AB-C19EBEDB4AB8}" dt="2021-03-12T06:25:10.475" v="1" actId="20577"/>
+        <pc:sldMkLst>
+          <pc:docMk/>
+          <pc:sldMk cId="510906916" sldId="257"/>
+        </pc:sldMkLst>
+        <pc:spChg chg="mod">
+          <ac:chgData name="Martin Cruz Medinilla" userId="97fb9944e3b81560" providerId="Windows Live" clId="Web-{C869A228-EF32-4135-B8AB-C19EBEDB4AB8}" dt="2021-03-12T06:25:10.475" v="1" actId="20577"/>
+          <ac:spMkLst>
+            <pc:docMk/>
+            <pc:sldMk cId="510906916" sldId="257"/>
+            <ac:spMk id="3" creationId="{00000000-0000-0000-0000-000000000000}"/>
+          </ac:spMkLst>
+        </pc:spChg>
+      </pc:sldChg>
+    </pc:docChg>
+  </pc:docChgLst>
+  <pc:docChgLst>
+    <pc:chgData name="Martin Cruz Medinilla" userId="97fb9944e3b81560" providerId="Windows Live" clId="Web-{6C1BA623-70D9-46C5-ADD1-F2B18404CFA1}"/>
+    <pc:docChg chg="modSld">
+      <pc:chgData name="Martin Cruz Medinilla" userId="97fb9944e3b81560" providerId="Windows Live" clId="Web-{6C1BA623-70D9-46C5-ADD1-F2B18404CFA1}" dt="2021-03-07T00:34:53.512" v="158" actId="20577"/>
+      <pc:docMkLst>
+        <pc:docMk/>
+      </pc:docMkLst>
+      <pc:sldChg chg="delSp modSp">
+        <pc:chgData name="Martin Cruz Medinilla" userId="97fb9944e3b81560" providerId="Windows Live" clId="Web-{6C1BA623-70D9-46C5-ADD1-F2B18404CFA1}" dt="2021-03-07T00:31:14.418" v="21"/>
+        <pc:sldMkLst>
+          <pc:docMk/>
+          <pc:sldMk cId="3216943570" sldId="256"/>
+        </pc:sldMkLst>
+        <pc:spChg chg="mod">
+          <ac:chgData name="Martin Cruz Medinilla" userId="97fb9944e3b81560" providerId="Windows Live" clId="Web-{6C1BA623-70D9-46C5-ADD1-F2B18404CFA1}" dt="2021-03-07T00:31:05.808" v="20" actId="20577"/>
+          <ac:spMkLst>
+            <pc:docMk/>
+            <pc:sldMk cId="3216943570" sldId="256"/>
+            <ac:spMk id="2" creationId="{00000000-0000-0000-0000-000000000000}"/>
+          </ac:spMkLst>
+        </pc:spChg>
+        <pc:spChg chg="del">
+          <ac:chgData name="Martin Cruz Medinilla" userId="97fb9944e3b81560" providerId="Windows Live" clId="Web-{6C1BA623-70D9-46C5-ADD1-F2B18404CFA1}" dt="2021-03-07T00:31:14.418" v="21"/>
+          <ac:spMkLst>
+            <pc:docMk/>
+            <pc:sldMk cId="3216943570" sldId="256"/>
+            <ac:spMk id="3" creationId="{903062E1-787C-475E-A2E0-8B5CCA248C97}"/>
+          </ac:spMkLst>
+        </pc:spChg>
+      </pc:sldChg>
+      <pc:sldChg chg="modSp">
+        <pc:chgData name="Martin Cruz Medinilla" userId="97fb9944e3b81560" providerId="Windows Live" clId="Web-{6C1BA623-70D9-46C5-ADD1-F2B18404CFA1}" dt="2021-03-07T00:33:40.818" v="114" actId="20577"/>
+        <pc:sldMkLst>
+          <pc:docMk/>
+          <pc:sldMk cId="510906916" sldId="257"/>
+        </pc:sldMkLst>
+        <pc:spChg chg="mod">
+          <ac:chgData name="Martin Cruz Medinilla" userId="97fb9944e3b81560" providerId="Windows Live" clId="Web-{6C1BA623-70D9-46C5-ADD1-F2B18404CFA1}" dt="2021-03-07T00:31:41.748" v="22" actId="20577"/>
+          <ac:spMkLst>
+            <pc:docMk/>
+            <pc:sldMk cId="510906916" sldId="257"/>
+            <ac:spMk id="2" creationId="{00000000-0000-0000-0000-000000000000}"/>
+          </ac:spMkLst>
+        </pc:spChg>
+        <pc:spChg chg="mod">
+          <ac:chgData name="Martin Cruz Medinilla" userId="97fb9944e3b81560" providerId="Windows Live" clId="Web-{6C1BA623-70D9-46C5-ADD1-F2B18404CFA1}" dt="2021-03-07T00:33:40.818" v="114" actId="20577"/>
+          <ac:spMkLst>
+            <pc:docMk/>
+            <pc:sldMk cId="510906916" sldId="257"/>
+            <ac:spMk id="3" creationId="{00000000-0000-0000-0000-000000000000}"/>
+          </ac:spMkLst>
+        </pc:spChg>
+      </pc:sldChg>
+      <pc:sldChg chg="modSp">
+        <pc:chgData name="Martin Cruz Medinilla" userId="97fb9944e3b81560" providerId="Windows Live" clId="Web-{6C1BA623-70D9-46C5-ADD1-F2B18404CFA1}" dt="2021-03-07T00:34:53.512" v="158" actId="20577"/>
+        <pc:sldMkLst>
+          <pc:docMk/>
+          <pc:sldMk cId="3041236276" sldId="258"/>
+        </pc:sldMkLst>
+        <pc:spChg chg="mod">
+          <ac:chgData name="Martin Cruz Medinilla" userId="97fb9944e3b81560" providerId="Windows Live" clId="Web-{6C1BA623-70D9-46C5-ADD1-F2B18404CFA1}" dt="2021-03-07T00:34:53.512" v="158" actId="20577"/>
+          <ac:spMkLst>
+            <pc:docMk/>
+            <pc:sldMk cId="3041236276" sldId="258"/>
+            <ac:spMk id="3" creationId="{00000000-0000-0000-0000-000000000000}"/>
+          </ac:spMkLst>
+        </pc:spChg>
+      </pc:sldChg>
+    </pc:docChg>
+  </pc:docChgLst>
+  <pc:docChgLst>
+    <pc:chgData name="Martin Cruz Medinilla" userId="97fb9944e3b81560" providerId="Windows Live" clId="Web-{9165F525-19EE-4A82-8DD3-28598AF808C0}"/>
+    <pc:docChg chg="modSld">
+      <pc:chgData name="Martin Cruz Medinilla" userId="97fb9944e3b81560" providerId="Windows Live" clId="Web-{9165F525-19EE-4A82-8DD3-28598AF808C0}" dt="2021-03-06T21:37:34.864" v="61" actId="20577"/>
+      <pc:docMkLst>
+        <pc:docMk/>
+      </pc:docMkLst>
+      <pc:sldChg chg="modSp">
+        <pc:chgData name="Martin Cruz Medinilla" userId="97fb9944e3b81560" providerId="Windows Live" clId="Web-{9165F525-19EE-4A82-8DD3-28598AF808C0}" dt="2021-03-06T21:37:34.864" v="61" actId="20577"/>
+        <pc:sldMkLst>
+          <pc:docMk/>
+          <pc:sldMk cId="1143618442" sldId="259"/>
+        </pc:sldMkLst>
+        <pc:spChg chg="mod">
+          <ac:chgData name="Martin Cruz Medinilla" userId="97fb9944e3b81560" providerId="Windows Live" clId="Web-{9165F525-19EE-4A82-8DD3-28598AF808C0}" dt="2021-03-06T21:37:34.864" v="61" actId="20577"/>
+          <ac:spMkLst>
+            <pc:docMk/>
+            <pc:sldMk cId="1143618442" sldId="259"/>
+            <ac:spMk id="3" creationId="{00000000-0000-0000-0000-000000000000}"/>
+          </ac:spMkLst>
+        </pc:spChg>
+      </pc:sldChg>
+    </pc:docChg>
+  </pc:docChgLst>
+  <pc:docChgLst>
+    <pc:chgData name="Martin Cruz Medinilla" userId="97fb9944e3b81560" providerId="Windows Live" clId="Web-{C864E01D-327D-4EE1-B8FE-68312D054438}"/>
+    <pc:docChg chg="modSld sldOrd">
+      <pc:chgData name="Martin Cruz Medinilla" userId="97fb9944e3b81560" providerId="Windows Live" clId="Web-{C864E01D-327D-4EE1-B8FE-68312D054438}" dt="2021-03-07T00:15:20.684" v="30"/>
+      <pc:docMkLst>
+        <pc:docMk/>
+      </pc:docMkLst>
+      <pc:sldChg chg="addSp modSp">
+        <pc:chgData name="Martin Cruz Medinilla" userId="97fb9944e3b81560" providerId="Windows Live" clId="Web-{C864E01D-327D-4EE1-B8FE-68312D054438}" dt="2021-03-07T00:15:20.684" v="30"/>
+        <pc:sldMkLst>
+          <pc:docMk/>
+          <pc:sldMk cId="3216943570" sldId="256"/>
+        </pc:sldMkLst>
+        <pc:spChg chg="add mod">
+          <ac:chgData name="Martin Cruz Medinilla" userId="97fb9944e3b81560" providerId="Windows Live" clId="Web-{C864E01D-327D-4EE1-B8FE-68312D054438}" dt="2021-03-07T00:15:20.684" v="30"/>
+          <ac:spMkLst>
+            <pc:docMk/>
+            <pc:sldMk cId="3216943570" sldId="256"/>
+            <ac:spMk id="3" creationId="{903062E1-787C-475E-A2E0-8B5CCA248C97}"/>
+          </ac:spMkLst>
+        </pc:spChg>
+      </pc:sldChg>
+      <pc:sldChg chg="ord">
+        <pc:chgData name="Martin Cruz Medinilla" userId="97fb9944e3b81560" providerId="Windows Live" clId="Web-{C864E01D-327D-4EE1-B8FE-68312D054438}" dt="2021-03-07T00:14:32.916" v="0"/>
+        <pc:sldMkLst>
+          <pc:docMk/>
+          <pc:sldMk cId="3041236276" sldId="258"/>
+        </pc:sldMkLst>
+      </pc:sldChg>
+    </pc:docChg>
+  </pc:docChgLst>
+</pc:chgInfo>
+</file>
+
 <file path=ppt/slideLayouts/slideLayout1.xml><?xml version="1.0" encoding="utf-8"?>
 <p:sldLayout xmlns:a="http://schemas.openxmlformats.org/drawingml/2006/main" xmlns:r="http://schemas.openxmlformats.org/officeDocument/2006/relationships" xmlns:p="http://schemas.openxmlformats.org/presentationml/2006/main" type="title" preserve="1">
   <p:cSld name="Diapositiva de título">
@@ -202,7 +368,7 @@
           </a:lstStyle>
           <a:p>
             <a:r>
-              <a:rPr lang="es-ES" smtClean="0"/>
+              <a:rPr lang="es-ES"/>
               <a:t>Haga clic para modificar el estilo de título del patrón</a:t>
             </a:r>
             <a:endParaRPr lang="en-US" dirty="0"/>
@@ -321,7 +487,7 @@
           </a:lstStyle>
           <a:p>
             <a:r>
-              <a:rPr lang="es-ES" smtClean="0"/>
+              <a:rPr lang="es-ES"/>
               <a:t>Haga clic para editar el estilo de subtítulo del patrón</a:t>
             </a:r>
             <a:endParaRPr lang="en-US" dirty="0"/>
@@ -361,7 +527,7 @@
           <a:p>
             <a:fld id="{941820D4-FD18-40B0-A2DA-577109253211}" type="datetimeFigureOut">
               <a:rPr lang="es-MX" smtClean="0"/>
-              <a:t>06/03/2021</a:t>
+              <a:t>11/03/2021</a:t>
             </a:fld>
             <a:endParaRPr lang="es-MX"/>
           </a:p>
@@ -531,7 +697,7 @@
           <a:lstStyle/>
           <a:p>
             <a:r>
-              <a:rPr lang="es-ES" smtClean="0"/>
+              <a:rPr lang="es-ES"/>
               <a:t>Haga clic para modificar el estilo de título del patrón</a:t>
             </a:r>
             <a:endParaRPr lang="en-US" dirty="0"/>
@@ -571,35 +737,35 @@
           <a:p>
             <a:pPr lvl="0"/>
             <a:r>
-              <a:rPr lang="es-ES" smtClean="0"/>
+              <a:rPr lang="es-ES"/>
               <a:t>Editar el estilo de texto del patrón</a:t>
             </a:r>
           </a:p>
           <a:p>
             <a:pPr lvl="1"/>
             <a:r>
-              <a:rPr lang="es-ES" smtClean="0"/>
+              <a:rPr lang="es-ES"/>
               <a:t>Segundo nivel</a:t>
             </a:r>
           </a:p>
           <a:p>
             <a:pPr lvl="2"/>
             <a:r>
-              <a:rPr lang="es-ES" smtClean="0"/>
+              <a:rPr lang="es-ES"/>
               <a:t>Tercer nivel</a:t>
             </a:r>
           </a:p>
           <a:p>
             <a:pPr lvl="3"/>
             <a:r>
-              <a:rPr lang="es-ES" smtClean="0"/>
+              <a:rPr lang="es-ES"/>
               <a:t>Cuarto nivel</a:t>
             </a:r>
           </a:p>
           <a:p>
             <a:pPr lvl="4"/>
             <a:r>
-              <a:rPr lang="es-ES" smtClean="0"/>
+              <a:rPr lang="es-ES"/>
               <a:t>Quinto nivel</a:t>
             </a:r>
             <a:endParaRPr lang="en-US" dirty="0"/>
@@ -623,7 +789,7 @@
           <a:p>
             <a:fld id="{941820D4-FD18-40B0-A2DA-577109253211}" type="datetimeFigureOut">
               <a:rPr lang="es-MX" smtClean="0"/>
-              <a:t>06/03/2021</a:t>
+              <a:t>11/03/2021</a:t>
             </a:fld>
             <a:endParaRPr lang="es-MX"/>
           </a:p>
@@ -761,7 +927,7 @@
           <a:lstStyle/>
           <a:p>
             <a:r>
-              <a:rPr lang="es-ES" smtClean="0"/>
+              <a:rPr lang="es-ES"/>
               <a:t>Haga clic para modificar el estilo de título del patrón</a:t>
             </a:r>
             <a:endParaRPr lang="en-US" dirty="0"/>
@@ -790,35 +956,35 @@
           <a:p>
             <a:pPr lvl="0"/>
             <a:r>
-              <a:rPr lang="es-ES" smtClean="0"/>
+              <a:rPr lang="es-ES"/>
               <a:t>Editar el estilo de texto del patrón</a:t>
             </a:r>
           </a:p>
           <a:p>
             <a:pPr lvl="1"/>
             <a:r>
-              <a:rPr lang="es-ES" smtClean="0"/>
+              <a:rPr lang="es-ES"/>
               <a:t>Segundo nivel</a:t>
             </a:r>
           </a:p>
           <a:p>
             <a:pPr lvl="2"/>
             <a:r>
-              <a:rPr lang="es-ES" smtClean="0"/>
+              <a:rPr lang="es-ES"/>
               <a:t>Tercer nivel</a:t>
             </a:r>
           </a:p>
           <a:p>
             <a:pPr lvl="3"/>
             <a:r>
-              <a:rPr lang="es-ES" smtClean="0"/>
+              <a:rPr lang="es-ES"/>
               <a:t>Cuarto nivel</a:t>
             </a:r>
           </a:p>
           <a:p>
             <a:pPr lvl="4"/>
             <a:r>
-              <a:rPr lang="es-ES" smtClean="0"/>
+              <a:rPr lang="es-ES"/>
               <a:t>Quinto nivel</a:t>
             </a:r>
             <a:endParaRPr lang="en-US" dirty="0"/>
@@ -858,7 +1024,7 @@
           <a:p>
             <a:fld id="{941820D4-FD18-40B0-A2DA-577109253211}" type="datetimeFigureOut">
               <a:rPr lang="es-MX" smtClean="0"/>
-              <a:t>06/03/2021</a:t>
+              <a:t>11/03/2021</a:t>
             </a:fld>
             <a:endParaRPr lang="es-MX"/>
           </a:p>
@@ -1017,7 +1183,7 @@
           <a:lstStyle/>
           <a:p>
             <a:r>
-              <a:rPr lang="es-ES" smtClean="0"/>
+              <a:rPr lang="es-ES"/>
               <a:t>Haga clic para modificar el estilo de título del patrón</a:t>
             </a:r>
             <a:endParaRPr lang="en-US" dirty="0"/>
@@ -1046,35 +1212,35 @@
           <a:p>
             <a:pPr lvl="0"/>
             <a:r>
-              <a:rPr lang="es-ES" smtClean="0"/>
+              <a:rPr lang="es-ES"/>
               <a:t>Editar el estilo de texto del patrón</a:t>
             </a:r>
           </a:p>
           <a:p>
             <a:pPr lvl="1"/>
             <a:r>
-              <a:rPr lang="es-ES" smtClean="0"/>
+              <a:rPr lang="es-ES"/>
               <a:t>Segundo nivel</a:t>
             </a:r>
           </a:p>
           <a:p>
             <a:pPr lvl="2"/>
             <a:r>
-              <a:rPr lang="es-ES" smtClean="0"/>
+              <a:rPr lang="es-ES"/>
               <a:t>Tercer nivel</a:t>
             </a:r>
           </a:p>
           <a:p>
             <a:pPr lvl="3"/>
             <a:r>
-              <a:rPr lang="es-ES" smtClean="0"/>
+              <a:rPr lang="es-ES"/>
               <a:t>Cuarto nivel</a:t>
             </a:r>
           </a:p>
           <a:p>
             <a:pPr lvl="4"/>
             <a:r>
-              <a:rPr lang="es-ES" smtClean="0"/>
+              <a:rPr lang="es-ES"/>
               <a:t>Quinto nivel</a:t>
             </a:r>
             <a:endParaRPr lang="en-US" dirty="0"/>
@@ -1098,7 +1264,7 @@
           <a:p>
             <a:fld id="{941820D4-FD18-40B0-A2DA-577109253211}" type="datetimeFigureOut">
               <a:rPr lang="es-MX" smtClean="0"/>
-              <a:t>06/03/2021</a:t>
+              <a:t>11/03/2021</a:t>
             </a:fld>
             <a:endParaRPr lang="es-MX"/>
           </a:p>
@@ -1251,7 +1417,7 @@
           </a:lstStyle>
           <a:p>
             <a:r>
-              <a:rPr lang="es-ES" smtClean="0"/>
+              <a:rPr lang="es-ES"/>
               <a:t>Haga clic para modificar el estilo de título del patrón</a:t>
             </a:r>
             <a:endParaRPr lang="en-US" dirty="0"/>
@@ -1371,7 +1537,7 @@
           <a:p>
             <a:pPr lvl="0"/>
             <a:r>
-              <a:rPr lang="es-ES" smtClean="0"/>
+              <a:rPr lang="es-ES"/>
               <a:t>Editar el estilo de texto del patrón</a:t>
             </a:r>
           </a:p>
@@ -1405,7 +1571,7 @@
           <a:p>
             <a:fld id="{941820D4-FD18-40B0-A2DA-577109253211}" type="datetimeFigureOut">
               <a:rPr lang="es-MX" smtClean="0"/>
-              <a:t>06/03/2021</a:t>
+              <a:t>11/03/2021</a:t>
             </a:fld>
             <a:endParaRPr lang="es-MX"/>
           </a:p>
@@ -1565,7 +1731,7 @@
           <a:lstStyle/>
           <a:p>
             <a:r>
-              <a:rPr lang="es-ES" smtClean="0"/>
+              <a:rPr lang="es-ES"/>
               <a:t>Haga clic para modificar el estilo de título del patrón</a:t>
             </a:r>
             <a:endParaRPr lang="en-US" dirty="0"/>
@@ -1596,35 +1762,35 @@
           <a:p>
             <a:pPr lvl="0"/>
             <a:r>
-              <a:rPr lang="es-ES" smtClean="0"/>
+              <a:rPr lang="es-ES"/>
               <a:t>Editar el estilo de texto del patrón</a:t>
             </a:r>
           </a:p>
           <a:p>
             <a:pPr lvl="1"/>
             <a:r>
-              <a:rPr lang="es-ES" smtClean="0"/>
+              <a:rPr lang="es-ES"/>
               <a:t>Segundo nivel</a:t>
             </a:r>
           </a:p>
           <a:p>
             <a:pPr lvl="2"/>
             <a:r>
-              <a:rPr lang="es-ES" smtClean="0"/>
+              <a:rPr lang="es-ES"/>
               <a:t>Tercer nivel</a:t>
             </a:r>
           </a:p>
           <a:p>
             <a:pPr lvl="3"/>
             <a:r>
-              <a:rPr lang="es-ES" smtClean="0"/>
+              <a:rPr lang="es-ES"/>
               <a:t>Cuarto nivel</a:t>
             </a:r>
           </a:p>
           <a:p>
             <a:pPr lvl="4"/>
             <a:r>
-              <a:rPr lang="es-ES" smtClean="0"/>
+              <a:rPr lang="es-ES"/>
               <a:t>Quinto nivel</a:t>
             </a:r>
             <a:endParaRPr lang="en-US" dirty="0"/>
@@ -1655,35 +1821,35 @@
           <a:p>
             <a:pPr lvl="0"/>
             <a:r>
-              <a:rPr lang="es-ES" smtClean="0"/>
+              <a:rPr lang="es-ES"/>
               <a:t>Editar el estilo de texto del patrón</a:t>
             </a:r>
           </a:p>
           <a:p>
             <a:pPr lvl="1"/>
             <a:r>
-              <a:rPr lang="es-ES" smtClean="0"/>
+              <a:rPr lang="es-ES"/>
               <a:t>Segundo nivel</a:t>
             </a:r>
           </a:p>
           <a:p>
             <a:pPr lvl="2"/>
             <a:r>
-              <a:rPr lang="es-ES" smtClean="0"/>
+              <a:rPr lang="es-ES"/>
               <a:t>Tercer nivel</a:t>
             </a:r>
           </a:p>
           <a:p>
             <a:pPr lvl="3"/>
             <a:r>
-              <a:rPr lang="es-ES" smtClean="0"/>
+              <a:rPr lang="es-ES"/>
               <a:t>Cuarto nivel</a:t>
             </a:r>
           </a:p>
           <a:p>
             <a:pPr lvl="4"/>
             <a:r>
-              <a:rPr lang="es-ES" smtClean="0"/>
+              <a:rPr lang="es-ES"/>
               <a:t>Quinto nivel</a:t>
             </a:r>
             <a:endParaRPr lang="en-US" dirty="0"/>
@@ -1707,7 +1873,7 @@
           <a:p>
             <a:fld id="{941820D4-FD18-40B0-A2DA-577109253211}" type="datetimeFigureOut">
               <a:rPr lang="es-MX" smtClean="0"/>
-              <a:t>06/03/2021</a:t>
+              <a:t>11/03/2021</a:t>
             </a:fld>
             <a:endParaRPr lang="es-MX"/>
           </a:p>
@@ -1845,7 +2011,7 @@
           <a:lstStyle/>
           <a:p>
             <a:r>
-              <a:rPr lang="es-ES" smtClean="0"/>
+              <a:rPr lang="es-ES"/>
               <a:t>Haga clic para modificar el estilo de título del patrón</a:t>
             </a:r>
             <a:endParaRPr lang="en-US" dirty="0"/>
@@ -1917,7 +2083,7 @@
           <a:p>
             <a:pPr lvl="0"/>
             <a:r>
-              <a:rPr lang="es-ES" smtClean="0"/>
+              <a:rPr lang="es-ES"/>
               <a:t>Editar el estilo de texto del patrón</a:t>
             </a:r>
           </a:p>
@@ -1947,35 +2113,35 @@
           <a:p>
             <a:pPr lvl="0"/>
             <a:r>
-              <a:rPr lang="es-ES" smtClean="0"/>
+              <a:rPr lang="es-ES"/>
               <a:t>Editar el estilo de texto del patrón</a:t>
             </a:r>
           </a:p>
           <a:p>
             <a:pPr lvl="1"/>
             <a:r>
-              <a:rPr lang="es-ES" smtClean="0"/>
+              <a:rPr lang="es-ES"/>
               <a:t>Segundo nivel</a:t>
             </a:r>
           </a:p>
           <a:p>
             <a:pPr lvl="2"/>
             <a:r>
-              <a:rPr lang="es-ES" smtClean="0"/>
+              <a:rPr lang="es-ES"/>
               <a:t>Tercer nivel</a:t>
             </a:r>
           </a:p>
           <a:p>
             <a:pPr lvl="3"/>
             <a:r>
-              <a:rPr lang="es-ES" smtClean="0"/>
+              <a:rPr lang="es-ES"/>
               <a:t>Cuarto nivel</a:t>
             </a:r>
           </a:p>
           <a:p>
             <a:pPr lvl="4"/>
             <a:r>
-              <a:rPr lang="es-ES" smtClean="0"/>
+              <a:rPr lang="es-ES"/>
               <a:t>Quinto nivel</a:t>
             </a:r>
             <a:endParaRPr lang="en-US" dirty="0"/>
@@ -2047,7 +2213,7 @@
           <a:p>
             <a:pPr lvl="0"/>
             <a:r>
-              <a:rPr lang="es-ES" smtClean="0"/>
+              <a:rPr lang="es-ES"/>
               <a:t>Editar el estilo de texto del patrón</a:t>
             </a:r>
           </a:p>
@@ -2077,35 +2243,35 @@
           <a:p>
             <a:pPr lvl="0"/>
             <a:r>
-              <a:rPr lang="es-ES" smtClean="0"/>
+              <a:rPr lang="es-ES"/>
               <a:t>Editar el estilo de texto del patrón</a:t>
             </a:r>
           </a:p>
           <a:p>
             <a:pPr lvl="1"/>
             <a:r>
-              <a:rPr lang="es-ES" smtClean="0"/>
+              <a:rPr lang="es-ES"/>
               <a:t>Segundo nivel</a:t>
             </a:r>
           </a:p>
           <a:p>
             <a:pPr lvl="2"/>
             <a:r>
-              <a:rPr lang="es-ES" smtClean="0"/>
+              <a:rPr lang="es-ES"/>
               <a:t>Tercer nivel</a:t>
             </a:r>
           </a:p>
           <a:p>
             <a:pPr lvl="3"/>
             <a:r>
-              <a:rPr lang="es-ES" smtClean="0"/>
+              <a:rPr lang="es-ES"/>
               <a:t>Cuarto nivel</a:t>
             </a:r>
           </a:p>
           <a:p>
             <a:pPr lvl="4"/>
             <a:r>
-              <a:rPr lang="es-ES" smtClean="0"/>
+              <a:rPr lang="es-ES"/>
               <a:t>Quinto nivel</a:t>
             </a:r>
             <a:endParaRPr lang="en-US" dirty="0"/>
@@ -2129,7 +2295,7 @@
           <a:p>
             <a:fld id="{941820D4-FD18-40B0-A2DA-577109253211}" type="datetimeFigureOut">
               <a:rPr lang="es-MX" smtClean="0"/>
-              <a:t>06/03/2021</a:t>
+              <a:t>11/03/2021</a:t>
             </a:fld>
             <a:endParaRPr lang="es-MX"/>
           </a:p>
@@ -2267,7 +2433,7 @@
           <a:lstStyle/>
           <a:p>
             <a:r>
-              <a:rPr lang="es-ES" smtClean="0"/>
+              <a:rPr lang="es-ES"/>
               <a:t>Haga clic para modificar el estilo de título del patrón</a:t>
             </a:r>
             <a:endParaRPr lang="en-US" dirty="0"/>
@@ -2291,7 +2457,7 @@
           <a:p>
             <a:fld id="{941820D4-FD18-40B0-A2DA-577109253211}" type="datetimeFigureOut">
               <a:rPr lang="es-MX" smtClean="0"/>
-              <a:t>06/03/2021</a:t>
+              <a:t>11/03/2021</a:t>
             </a:fld>
             <a:endParaRPr lang="es-MX"/>
           </a:p>
@@ -2386,7 +2552,7 @@
           <a:p>
             <a:fld id="{941820D4-FD18-40B0-A2DA-577109253211}" type="datetimeFigureOut">
               <a:rPr lang="es-MX" smtClean="0"/>
-              <a:t>06/03/2021</a:t>
+              <a:t>11/03/2021</a:t>
             </a:fld>
             <a:endParaRPr lang="es-MX"/>
           </a:p>
@@ -2535,7 +2701,7 @@
           </a:lstStyle>
           <a:p>
             <a:r>
-              <a:rPr lang="es-ES" smtClean="0"/>
+              <a:rPr lang="es-ES"/>
               <a:t>Haga clic para modificar el estilo de título del patrón</a:t>
             </a:r>
             <a:endParaRPr lang="en-US" dirty="0"/>
@@ -2630,35 +2796,35 @@
           <a:p>
             <a:pPr lvl="0"/>
             <a:r>
-              <a:rPr lang="es-ES" smtClean="0"/>
+              <a:rPr lang="es-ES"/>
               <a:t>Editar el estilo de texto del patrón</a:t>
             </a:r>
           </a:p>
           <a:p>
             <a:pPr lvl="1"/>
             <a:r>
-              <a:rPr lang="es-ES" smtClean="0"/>
+              <a:rPr lang="es-ES"/>
               <a:t>Segundo nivel</a:t>
             </a:r>
           </a:p>
           <a:p>
             <a:pPr lvl="2"/>
             <a:r>
-              <a:rPr lang="es-ES" smtClean="0"/>
+              <a:rPr lang="es-ES"/>
               <a:t>Tercer nivel</a:t>
             </a:r>
           </a:p>
           <a:p>
             <a:pPr lvl="3"/>
             <a:r>
-              <a:rPr lang="es-ES" smtClean="0"/>
+              <a:rPr lang="es-ES"/>
               <a:t>Cuarto nivel</a:t>
             </a:r>
           </a:p>
           <a:p>
             <a:pPr lvl="4"/>
             <a:r>
-              <a:rPr lang="es-ES" smtClean="0"/>
+              <a:rPr lang="es-ES"/>
               <a:t>Quinto nivel</a:t>
             </a:r>
             <a:endParaRPr lang="en-US" dirty="0"/>
@@ -2730,7 +2896,7 @@
           <a:p>
             <a:pPr lvl="0"/>
             <a:r>
-              <a:rPr lang="es-ES" smtClean="0"/>
+              <a:rPr lang="es-ES"/>
               <a:t>Editar el estilo de texto del patrón</a:t>
             </a:r>
           </a:p>
@@ -2764,7 +2930,7 @@
           <a:p>
             <a:fld id="{941820D4-FD18-40B0-A2DA-577109253211}" type="datetimeFigureOut">
               <a:rPr lang="es-MX" smtClean="0"/>
-              <a:t>06/03/2021</a:t>
+              <a:t>11/03/2021</a:t>
             </a:fld>
             <a:endParaRPr lang="es-MX"/>
           </a:p>
@@ -2895,7 +3061,7 @@
           </a:lstStyle>
           <a:p>
             <a:r>
-              <a:rPr lang="es-ES" smtClean="0"/>
+              <a:rPr lang="es-ES"/>
               <a:t>Haga clic para modificar el estilo de título del patrón</a:t>
             </a:r>
             <a:endParaRPr lang="en-US" dirty="0"/>
@@ -2962,7 +3128,7 @@
           </a:lstStyle>
           <a:p>
             <a:r>
-              <a:rPr lang="es-ES" smtClean="0"/>
+              <a:rPr lang="es-ES"/>
               <a:t>Haga clic en el icono para agregar una imagen</a:t>
             </a:r>
             <a:endParaRPr lang="en-US" dirty="0"/>
@@ -3030,7 +3196,7 @@
           <a:p>
             <a:pPr lvl="0"/>
             <a:r>
-              <a:rPr lang="es-ES" smtClean="0"/>
+              <a:rPr lang="es-ES"/>
               <a:t>Editar el estilo de texto del patrón</a:t>
             </a:r>
           </a:p>
@@ -3053,7 +3219,7 @@
           <a:p>
             <a:fld id="{941820D4-FD18-40B0-A2DA-577109253211}" type="datetimeFigureOut">
               <a:rPr lang="es-MX" smtClean="0"/>
-              <a:t>06/03/2021</a:t>
+              <a:t>11/03/2021</a:t>
             </a:fld>
             <a:endParaRPr lang="es-MX"/>
           </a:p>
@@ -3162,7 +3328,7 @@
           <a:lstStyle/>
           <a:p>
             <a:r>
-              <a:rPr lang="es-ES" smtClean="0"/>
+              <a:rPr lang="es-ES"/>
               <a:t>Haga clic para modificar el estilo de título del patrón</a:t>
             </a:r>
             <a:endParaRPr lang="en-US" dirty="0"/>
@@ -3196,35 +3362,35 @@
           <a:p>
             <a:pPr lvl="0"/>
             <a:r>
-              <a:rPr lang="es-ES" smtClean="0"/>
+              <a:rPr lang="es-ES"/>
               <a:t>Editar el estilo de texto del patrón</a:t>
             </a:r>
           </a:p>
           <a:p>
             <a:pPr lvl="1"/>
             <a:r>
-              <a:rPr lang="es-ES" smtClean="0"/>
+              <a:rPr lang="es-ES"/>
               <a:t>Segundo nivel</a:t>
             </a:r>
           </a:p>
           <a:p>
             <a:pPr lvl="2"/>
             <a:r>
-              <a:rPr lang="es-ES" smtClean="0"/>
+              <a:rPr lang="es-ES"/>
               <a:t>Tercer nivel</a:t>
             </a:r>
           </a:p>
           <a:p>
             <a:pPr lvl="3"/>
             <a:r>
-              <a:rPr lang="es-ES" smtClean="0"/>
+              <a:rPr lang="es-ES"/>
               <a:t>Cuarto nivel</a:t>
             </a:r>
           </a:p>
           <a:p>
             <a:pPr lvl="4"/>
             <a:r>
-              <a:rPr lang="es-ES" smtClean="0"/>
+              <a:rPr lang="es-ES"/>
               <a:t>Quinto nivel</a:t>
             </a:r>
             <a:endParaRPr lang="en-US" dirty="0"/>
@@ -3264,7 +3430,7 @@
           <a:p>
             <a:fld id="{941820D4-FD18-40B0-A2DA-577109253211}" type="datetimeFigureOut">
               <a:rPr lang="es-MX" smtClean="0"/>
-              <a:t>06/03/2021</a:t>
+              <a:t>11/03/2021</a:t>
             </a:fld>
             <a:endParaRPr lang="es-MX"/>
           </a:p>
@@ -3886,6 +4052,17 @@
           <a:lstStyle/>
           <a:p>
             <a:r>
+              <a:rPr lang="es-419" dirty="0"/>
+              <a:t>Recomendaciones</a:t>
+            </a:r>
+            <a:r>
+              <a:rPr lang="en-US" dirty="0"/>
+              <a:t> </a:t>
+            </a:r>
+            <a:br>
+              <a:rPr lang="en-US" dirty="0"/>
+            </a:br>
+            <a:r>
               <a:rPr lang="en-US" dirty="0"/>
               <a:t>Taller de REST API NODE</a:t>
             </a:r>
@@ -3916,7 +4093,7 @@
           <a:lstStyle/>
           <a:p>
             <a:r>
-              <a:rPr lang="en-US" dirty="0" smtClean="0">
+              <a:rPr lang="en-US" dirty="0">
                 <a:solidFill>
                   <a:schemeClr val="bg1"/>
                 </a:solidFill>
@@ -3954,7 +4131,7 @@
           <a:lstStyle/>
           <a:p>
             <a:r>
-              <a:rPr lang="en-US" dirty="0" smtClean="0">
+              <a:rPr lang="en-US" dirty="0">
                 <a:solidFill>
                   <a:schemeClr val="bg1"/>
                 </a:solidFill>
@@ -4016,18 +4193,13 @@
           <a:lstStyle/>
           <a:p>
             <a:r>
-              <a:rPr lang="es-MX" dirty="0" smtClean="0">
+              <a:rPr lang="es-MX" dirty="0">
                 <a:solidFill>
                   <a:schemeClr val="bg1"/>
                 </a:solidFill>
               </a:rPr>
               <a:t>Universe Code</a:t>
             </a:r>
-            <a:endParaRPr lang="es-MX" dirty="0">
-              <a:solidFill>
-                <a:schemeClr val="bg1"/>
-              </a:solidFill>
-            </a:endParaRPr>
           </a:p>
         </p:txBody>
       </p:sp>
@@ -4041,13 +4213,6 @@
   <p:clrMapOvr>
     <a:masterClrMapping/>
   </p:clrMapOvr>
-  <p:timing>
-    <p:tnLst>
-      <p:par>
-        <p:cTn id="1" dur="indefinite" restart="never" nodeType="tmRoot"/>
-      </p:par>
-    </p:tnLst>
-  </p:timing>
 </p:sld>
 </file>
 
@@ -4084,14 +4249,10 @@
           <a:lstStyle/>
           <a:p>
             <a:r>
-              <a:rPr lang="es-MX" dirty="0" smtClean="0"/>
-              <a:t>Objetivos</a:t>
-            </a:r>
-            <a:r>
-              <a:rPr lang="en-US" dirty="0" smtClean="0"/>
-              <a:t> </a:t>
-            </a:r>
-            <a:endParaRPr lang="es-MX" dirty="0"/>
+              <a:rPr lang="es-MX" dirty="0"/>
+              <a:t>Objetivo</a:t>
+            </a:r>
+            <a:endParaRPr lang="en-US" dirty="0"/>
           </a:p>
         </p:txBody>
       </p:sp>
@@ -4110,57 +4271,23 @@
           <a:bodyPr/>
           <a:lstStyle/>
           <a:p>
-            <a:r>
-              <a:rPr lang="en-US" dirty="0" smtClean="0"/>
-              <a:t>El </a:t>
-            </a:r>
-            <a:r>
-              <a:rPr lang="es-MX" dirty="0" smtClean="0"/>
-              <a:t>objetivo</a:t>
-            </a:r>
-            <a:r>
-              <a:rPr lang="en-US" dirty="0" smtClean="0"/>
-              <a:t> de </a:t>
-            </a:r>
-            <a:r>
-              <a:rPr lang="es-MX" dirty="0" smtClean="0"/>
-              <a:t>este</a:t>
-            </a:r>
-            <a:r>
-              <a:rPr lang="en-US" dirty="0" smtClean="0"/>
-              <a:t> video</a:t>
-            </a:r>
-          </a:p>
-          <a:p>
-            <a:r>
-              <a:rPr lang="es-MX" dirty="0" smtClean="0"/>
-              <a:t>¿Por que aprender a realizar servicios </a:t>
-            </a:r>
+            <a:pPr marL="305435" indent="-305435"/>
             <a:r>
               <a:rPr lang="es-MX" dirty="0"/>
-              <a:t>R</a:t>
-            </a:r>
-            <a:r>
-              <a:rPr lang="es-MX" dirty="0" smtClean="0"/>
-              <a:t>est?</a:t>
-            </a:r>
-          </a:p>
-          <a:p>
-            <a:r>
-              <a:rPr lang="en-US" dirty="0" smtClean="0"/>
-              <a:t>El </a:t>
-            </a:r>
-            <a:r>
-              <a:rPr lang="es-MX" dirty="0" smtClean="0"/>
-              <a:t>objetivo</a:t>
-            </a:r>
-            <a:r>
-              <a:rPr lang="en-US" dirty="0" smtClean="0"/>
-              <a:t> del taller</a:t>
-            </a:r>
-            <a:endParaRPr lang="es-MX" dirty="0" smtClean="0"/>
-          </a:p>
-          <a:p>
+              <a:t>Consejos para maximizar el aprovechamiento.</a:t>
+            </a:r>
+            <a:endParaRPr lang="es-MX"/>
+          </a:p>
+          <a:p>
+            <a:pPr marL="305435" indent="-305435"/>
+            <a:r>
+              <a:rPr lang="en-US" dirty="0"/>
+              <a:t>La meta del taller.</a:t>
+            </a:r>
+            <a:endParaRPr lang="es-MX" dirty="0"/>
+          </a:p>
+          <a:p>
+            <a:pPr marL="305435" indent="-305435"/>
             <a:endParaRPr lang="es-MX" dirty="0"/>
           </a:p>
         </p:txBody>
@@ -4175,13 +4302,6 @@
   <p:clrMapOvr>
     <a:masterClrMapping/>
   </p:clrMapOvr>
-  <p:timing>
-    <p:tnLst>
-      <p:par>
-        <p:cTn id="1" dur="indefinite" restart="never" nodeType="tmRoot"/>
-      </p:par>
-    </p:tnLst>
-  </p:timing>
 </p:sld>
 </file>
 
@@ -4218,10 +4338,9 @@
           <a:lstStyle/>
           <a:p>
             <a:r>
-              <a:rPr lang="es-MX" dirty="0" smtClean="0"/>
-              <a:t>Recomendaciones</a:t>
-            </a:r>
-            <a:endParaRPr lang="es-MX" dirty="0"/>
+              <a:rPr lang="es-MX" dirty="0"/>
+              <a:t>Herramientas de instalación </a:t>
+            </a:r>
           </a:p>
         </p:txBody>
       </p:sp>
@@ -4235,247 +4354,143 @@
             <p:ph idx="1"/>
           </p:nvPr>
         </p:nvSpPr>
-        <p:spPr/>
+        <p:spPr>
+          <a:xfrm>
+            <a:off x="581192" y="1946365"/>
+            <a:ext cx="11029615" cy="4715691"/>
+          </a:xfrm>
+        </p:spPr>
         <p:txBody>
           <a:bodyPr>
             <a:normAutofit/>
           </a:bodyPr>
           <a:lstStyle/>
           <a:p>
+            <a:pPr marL="305435" indent="-305435"/>
+            <a:r>
+              <a:rPr lang="en-US" dirty="0"/>
+              <a:t>Node</a:t>
+            </a:r>
+            <a:endParaRPr lang="es-MX" dirty="0"/>
+          </a:p>
+          <a:p>
+            <a:pPr marL="305435" indent="-305435"/>
+            <a:r>
+              <a:rPr lang="es-MX" dirty="0">
+                <a:hlinkClick r:id="rId2"/>
+              </a:rPr>
+              <a:t>https://nodejs.org/es/download/</a:t>
+            </a:r>
+            <a:r>
+              <a:rPr lang="es-MX" dirty="0"/>
+              <a:t> </a:t>
+            </a:r>
+          </a:p>
+          <a:p>
+            <a:pPr marL="305435" indent="-305435"/>
+            <a:r>
+              <a:rPr lang="es-MX" dirty="0"/>
+              <a:t>POSTGRESQL (No olvidar la contraseña que le pongan)</a:t>
+            </a:r>
+          </a:p>
+          <a:p>
+            <a:pPr marL="305435" indent="-305435"/>
+            <a:r>
+              <a:rPr lang="en-US" dirty="0">
+                <a:hlinkClick r:id="rId3"/>
+              </a:rPr>
+              <a:t>https://www.enterprisedb.com/downloads/postgres-postgresql-downloads</a:t>
+            </a:r>
+            <a:r>
+              <a:rPr lang="en-US" dirty="0"/>
+              <a:t> </a:t>
+            </a:r>
+          </a:p>
+          <a:p>
+            <a:pPr marL="305435" indent="-305435"/>
+            <a:r>
+              <a:rPr lang="en-US" dirty="0"/>
+              <a:t>GIT</a:t>
+            </a:r>
+          </a:p>
+          <a:p>
+            <a:pPr marL="305435" indent="-305435"/>
+            <a:r>
+              <a:rPr lang="en-US" dirty="0">
+                <a:hlinkClick r:id="rId4"/>
+              </a:rPr>
+              <a:t>https://git-scm.com/</a:t>
+            </a:r>
+            <a:r>
+              <a:rPr lang="en-US" dirty="0"/>
+              <a:t> </a:t>
+            </a:r>
+          </a:p>
+          <a:p>
+            <a:pPr marL="305435" indent="-305435"/>
+            <a:r>
+              <a:rPr lang="en-US" dirty="0"/>
+              <a:t>Visual studio code</a:t>
+            </a:r>
+          </a:p>
+          <a:p>
+            <a:pPr marL="305435" indent="-305435"/>
+            <a:r>
+              <a:rPr lang="en-US" dirty="0">
+                <a:hlinkClick r:id="rId5"/>
+              </a:rPr>
+              <a:t>https://code.visualstudio.com/download</a:t>
+            </a:r>
+            <a:r>
+              <a:rPr lang="en-US" dirty="0"/>
+              <a:t> </a:t>
+            </a:r>
+          </a:p>
+          <a:p>
+            <a:pPr marL="305435" indent="-305435"/>
+            <a:r>
+              <a:rPr lang="es-MX" dirty="0"/>
+              <a:t>POSTMAN </a:t>
+            </a:r>
+          </a:p>
+          <a:p>
+            <a:pPr marL="305435" indent="-305435"/>
+            <a:r>
+              <a:rPr lang="es-MX" dirty="0">
+                <a:hlinkClick r:id="rId6"/>
+              </a:rPr>
+              <a:t>https://www.postman.com/downloads/</a:t>
+            </a:r>
+            <a:r>
+              <a:rPr lang="es-MX" dirty="0"/>
+              <a:t> </a:t>
+            </a:r>
+          </a:p>
+          <a:p>
+            <a:pPr marL="305435" indent="-305435"/>
+            <a:r>
+              <a:rPr lang="es-MX" dirty="0"/>
+              <a:t>Crear una cuenta en GITHUB</a:t>
+            </a:r>
+          </a:p>
+          <a:p>
             <a:pPr marL="0" indent="0">
               <a:buNone/>
             </a:pPr>
-            <a:r>
-              <a:rPr lang="es-MX" sz="2000" dirty="0" smtClean="0">
-                <a:latin typeface="Arial" panose="020B0604020202020204" pitchFamily="34" charset="0"/>
-                <a:cs typeface="Arial" panose="020B0604020202020204" pitchFamily="34" charset="0"/>
-              </a:rPr>
-              <a:t>1. Instalar herramientas antes del </a:t>
-            </a:r>
-            <a:r>
-              <a:rPr lang="es-MX" sz="2000" dirty="0" smtClean="0">
-                <a:latin typeface="Arial" panose="020B0604020202020204" pitchFamily="34" charset="0"/>
-                <a:cs typeface="Arial" panose="020B0604020202020204" pitchFamily="34" charset="0"/>
-              </a:rPr>
-              <a:t>taller.</a:t>
-            </a:r>
-            <a:endParaRPr lang="es-MX" sz="2000" dirty="0" smtClean="0">
-              <a:latin typeface="Arial" panose="020B0604020202020204" pitchFamily="34" charset="0"/>
-              <a:cs typeface="Arial" panose="020B0604020202020204" pitchFamily="34" charset="0"/>
-            </a:endParaRPr>
-          </a:p>
-          <a:p>
-            <a:pPr marL="0" lvl="1" indent="0">
-              <a:spcBef>
-                <a:spcPts val="1000"/>
-              </a:spcBef>
-              <a:buNone/>
-            </a:pPr>
-            <a:r>
-              <a:rPr lang="es-MX" sz="2000" dirty="0" smtClean="0">
-                <a:latin typeface="Arial" panose="020B0604020202020204" pitchFamily="34" charset="0"/>
-                <a:cs typeface="Arial" panose="020B0604020202020204" pitchFamily="34" charset="0"/>
-              </a:rPr>
-              <a:t>2. Comandos </a:t>
-            </a:r>
-            <a:r>
-              <a:rPr lang="es-MX" sz="2000" dirty="0" smtClean="0">
-                <a:latin typeface="Arial" panose="020B0604020202020204" pitchFamily="34" charset="0"/>
-                <a:cs typeface="Arial" panose="020B0604020202020204" pitchFamily="34" charset="0"/>
-              </a:rPr>
-              <a:t>básicos de </a:t>
-            </a:r>
-            <a:r>
-              <a:rPr lang="es-MX" sz="2000" dirty="0" smtClean="0">
-                <a:latin typeface="Arial" panose="020B0604020202020204" pitchFamily="34" charset="0"/>
-                <a:cs typeface="Arial" panose="020B0604020202020204" pitchFamily="34" charset="0"/>
-              </a:rPr>
-              <a:t>GIT.</a:t>
-            </a:r>
-            <a:endParaRPr lang="es-MX" sz="2000" dirty="0" smtClean="0">
-              <a:latin typeface="Arial" panose="020B0604020202020204" pitchFamily="34" charset="0"/>
-              <a:cs typeface="Arial" panose="020B0604020202020204" pitchFamily="34" charset="0"/>
-            </a:endParaRPr>
-          </a:p>
-          <a:p>
-            <a:pPr marL="0" indent="0">
-              <a:buNone/>
-            </a:pPr>
-            <a:r>
-              <a:rPr lang="es-MX" sz="2000" dirty="0" smtClean="0">
-                <a:latin typeface="Arial" panose="020B0604020202020204" pitchFamily="34" charset="0"/>
-                <a:cs typeface="Arial" panose="020B0604020202020204" pitchFamily="34" charset="0"/>
-              </a:rPr>
-              <a:t>3. Lenguaje DML.</a:t>
-            </a:r>
-            <a:endParaRPr lang="es-MX" sz="2000" dirty="0" smtClean="0">
-              <a:latin typeface="Arial" panose="020B0604020202020204" pitchFamily="34" charset="0"/>
-              <a:cs typeface="Arial" panose="020B0604020202020204" pitchFamily="34" charset="0"/>
-            </a:endParaRPr>
-          </a:p>
-          <a:p>
-            <a:pPr marL="0" indent="0">
-              <a:buNone/>
-            </a:pPr>
-            <a:r>
-              <a:rPr lang="es-MX" sz="2000" dirty="0" smtClean="0">
-                <a:latin typeface="Arial" panose="020B0604020202020204" pitchFamily="34" charset="0"/>
-                <a:cs typeface="Arial" panose="020B0604020202020204" pitchFamily="34" charset="0"/>
-              </a:rPr>
-              <a:t>4. </a:t>
-            </a:r>
-            <a:r>
-              <a:rPr lang="es-MX" sz="2000" dirty="0" smtClean="0">
-                <a:latin typeface="Arial" panose="020B0604020202020204" pitchFamily="34" charset="0"/>
-                <a:cs typeface="Arial" panose="020B0604020202020204" pitchFamily="34" charset="0"/>
-              </a:rPr>
-              <a:t>Conocimientos </a:t>
-            </a:r>
-            <a:r>
-              <a:rPr lang="es-MX" sz="2000" dirty="0" smtClean="0">
-                <a:latin typeface="Arial" panose="020B0604020202020204" pitchFamily="34" charset="0"/>
-                <a:cs typeface="Arial" panose="020B0604020202020204" pitchFamily="34" charset="0"/>
-              </a:rPr>
-              <a:t>básicos en </a:t>
-            </a:r>
-            <a:r>
-              <a:rPr lang="es-MX" sz="2000" dirty="0" smtClean="0">
-                <a:latin typeface="Arial" panose="020B0604020202020204" pitchFamily="34" charset="0"/>
-                <a:cs typeface="Arial" panose="020B0604020202020204" pitchFamily="34" charset="0"/>
-              </a:rPr>
-              <a:t>JavaScript.</a:t>
-            </a:r>
-            <a:endParaRPr lang="en-US" dirty="0"/>
-          </a:p>
-          <a:p>
-            <a:pPr marL="0" lvl="1" indent="0">
-              <a:spcBef>
-                <a:spcPts val="1000"/>
-              </a:spcBef>
-              <a:buNone/>
-            </a:pPr>
-            <a:r>
-              <a:rPr lang="es-MX" sz="2000" dirty="0" smtClean="0">
-                <a:latin typeface="Arial" panose="020B0604020202020204" pitchFamily="34" charset="0"/>
-                <a:cs typeface="Arial" panose="020B0604020202020204" pitchFamily="34" charset="0"/>
-              </a:rPr>
-              <a:t>Opcional:</a:t>
-            </a:r>
-            <a:endParaRPr lang="es-MX" sz="2000" dirty="0">
-              <a:latin typeface="Arial" panose="020B0604020202020204" pitchFamily="34" charset="0"/>
-              <a:cs typeface="Arial" panose="020B0604020202020204" pitchFamily="34" charset="0"/>
-            </a:endParaRPr>
-          </a:p>
-          <a:p>
-            <a:pPr marL="0" lvl="1" indent="0">
-              <a:spcBef>
-                <a:spcPts val="1000"/>
-              </a:spcBef>
-              <a:buNone/>
-            </a:pPr>
-            <a:r>
-              <a:rPr lang="es-MX" sz="2000" dirty="0" smtClean="0">
-                <a:latin typeface="Arial" panose="020B0604020202020204" pitchFamily="34" charset="0"/>
-                <a:cs typeface="Arial" panose="020B0604020202020204" pitchFamily="34" charset="0"/>
-              </a:rPr>
-              <a:t>Familiarizarse</a:t>
-            </a:r>
-            <a:r>
-              <a:rPr lang="en-US" sz="2000" dirty="0" smtClean="0">
-                <a:latin typeface="Arial" panose="020B0604020202020204" pitchFamily="34" charset="0"/>
-                <a:cs typeface="Arial" panose="020B0604020202020204" pitchFamily="34" charset="0"/>
-              </a:rPr>
-              <a:t> </a:t>
-            </a:r>
-            <a:r>
-              <a:rPr lang="en-US" sz="2000" dirty="0">
-                <a:latin typeface="Arial" panose="020B0604020202020204" pitchFamily="34" charset="0"/>
-                <a:cs typeface="Arial" panose="020B0604020202020204" pitchFamily="34" charset="0"/>
-              </a:rPr>
-              <a:t>con </a:t>
-            </a:r>
-            <a:r>
-              <a:rPr lang="en-US" sz="2000" dirty="0" smtClean="0">
-                <a:latin typeface="Arial" panose="020B0604020202020204" pitchFamily="34" charset="0"/>
-                <a:cs typeface="Arial" panose="020B0604020202020204" pitchFamily="34" charset="0"/>
-              </a:rPr>
-              <a:t>el </a:t>
-            </a:r>
-            <a:r>
-              <a:rPr lang="es-MX" sz="2000" dirty="0" smtClean="0">
-                <a:latin typeface="Arial" panose="020B0604020202020204" pitchFamily="34" charset="0"/>
-                <a:cs typeface="Arial" panose="020B0604020202020204" pitchFamily="34" charset="0"/>
-              </a:rPr>
-              <a:t>modelo</a:t>
-            </a:r>
-            <a:r>
-              <a:rPr lang="en-US" sz="2000" dirty="0" smtClean="0">
-                <a:latin typeface="Arial" panose="020B0604020202020204" pitchFamily="34" charset="0"/>
-                <a:cs typeface="Arial" panose="020B0604020202020204" pitchFamily="34" charset="0"/>
-              </a:rPr>
-              <a:t> EVENTUC.JPG que </a:t>
-            </a:r>
-            <a:r>
-              <a:rPr lang="es-MX" sz="2000" dirty="0" smtClean="0">
-                <a:latin typeface="Arial" panose="020B0604020202020204" pitchFamily="34" charset="0"/>
-                <a:cs typeface="Arial" panose="020B0604020202020204" pitchFamily="34" charset="0"/>
-              </a:rPr>
-              <a:t>se encuentra en la carpeta </a:t>
-            </a:r>
-            <a:r>
-              <a:rPr lang="en-US" sz="2000" dirty="0" smtClean="0">
-                <a:latin typeface="Arial" panose="020B0604020202020204" pitchFamily="34" charset="0"/>
-                <a:cs typeface="Arial" panose="020B0604020202020204" pitchFamily="34" charset="0"/>
-              </a:rPr>
-              <a:t>base de </a:t>
-            </a:r>
-            <a:r>
-              <a:rPr lang="es-MX" sz="2000" dirty="0" smtClean="0">
-                <a:latin typeface="Arial" panose="020B0604020202020204" pitchFamily="34" charset="0"/>
-                <a:cs typeface="Arial" panose="020B0604020202020204" pitchFamily="34" charset="0"/>
-              </a:rPr>
-              <a:t>datos</a:t>
-            </a:r>
-            <a:r>
-              <a:rPr lang="en-US" sz="2000" dirty="0" smtClean="0">
-                <a:latin typeface="Arial" panose="020B0604020202020204" pitchFamily="34" charset="0"/>
-                <a:cs typeface="Arial" panose="020B0604020202020204" pitchFamily="34" charset="0"/>
-              </a:rPr>
-              <a:t>.</a:t>
-            </a:r>
-            <a:endParaRPr lang="es-MX" sz="2000" dirty="0">
-              <a:latin typeface="Arial" panose="020B0604020202020204" pitchFamily="34" charset="0"/>
-              <a:cs typeface="Arial" panose="020B0604020202020204" pitchFamily="34" charset="0"/>
-            </a:endParaRPr>
-          </a:p>
-          <a:p>
-            <a:pPr marL="0" indent="0">
-              <a:buNone/>
-            </a:pPr>
-            <a:endParaRPr lang="es-MX" sz="2000" dirty="0">
-              <a:latin typeface="Arial" panose="020B0604020202020204" pitchFamily="34" charset="0"/>
-              <a:cs typeface="Arial" panose="020B0604020202020204" pitchFamily="34" charset="0"/>
-            </a:endParaRPr>
+            <a:endParaRPr lang="es-MX" dirty="0"/>
           </a:p>
         </p:txBody>
       </p:sp>
     </p:spTree>
     <p:extLst>
       <p:ext uri="{BB962C8B-B14F-4D97-AF65-F5344CB8AC3E}">
-        <p14:creationId xmlns:p14="http://schemas.microsoft.com/office/powerpoint/2010/main" val="3041236276"/>
+        <p14:creationId xmlns:p14="http://schemas.microsoft.com/office/powerpoint/2010/main" val="1143618442"/>
       </p:ext>
     </p:extLst>
   </p:cSld>
   <p:clrMapOvr>
     <a:masterClrMapping/>
   </p:clrMapOvr>
-  <p:timing>
-    <p:tnLst>
-      <p:par>
-        <p:cTn id="1" dur="indefinite" restart="never" nodeType="tmRoot"/>
-      </p:par>
-    </p:tnLst>
-  </p:timing>
 </p:sld>
 </file>
 
@@ -4512,14 +4527,9 @@
           <a:lstStyle/>
           <a:p>
             <a:r>
-              <a:rPr lang="es-MX" dirty="0" smtClean="0"/>
-              <a:t>Herramientas de </a:t>
-            </a:r>
-            <a:r>
-              <a:rPr lang="es-MX" dirty="0" smtClean="0"/>
-              <a:t>instalación </a:t>
-            </a:r>
-            <a:endParaRPr lang="es-MX" dirty="0"/>
+              <a:rPr lang="es-MX" dirty="0"/>
+              <a:t>Recomendaciones</a:t>
+            </a:r>
           </a:p>
         </p:txBody>
       </p:sp>
@@ -4533,141 +4543,201 @@
             <p:ph idx="1"/>
           </p:nvPr>
         </p:nvSpPr>
-        <p:spPr>
-          <a:xfrm>
-            <a:off x="581192" y="1946365"/>
-            <a:ext cx="11029615" cy="4715691"/>
-          </a:xfrm>
-        </p:spPr>
+        <p:spPr/>
         <p:txBody>
           <a:bodyPr>
-            <a:normAutofit/>
+            <a:normAutofit lnSpcReduction="10000"/>
           </a:bodyPr>
           <a:lstStyle/>
           <a:p>
-            <a:r>
-              <a:rPr lang="en-US" dirty="0" smtClean="0"/>
-              <a:t>Node</a:t>
-            </a:r>
-            <a:endParaRPr lang="en-US" dirty="0" smtClean="0"/>
-          </a:p>
-          <a:p>
-            <a:r>
-              <a:rPr lang="es-MX" dirty="0" smtClean="0">
-                <a:hlinkClick r:id="rId2"/>
+            <a:pPr marL="0" indent="0">
+              <a:buNone/>
+            </a:pPr>
+            <a:r>
+              <a:rPr lang="es-MX" sz="2000" dirty="0">
+                <a:latin typeface="Arial" panose="020B0604020202020204" pitchFamily="34" charset="0"/>
+                <a:cs typeface="Arial" panose="020B0604020202020204" pitchFamily="34" charset="0"/>
               </a:rPr>
-              <a:t>https://nodejs.org/es/download/</a:t>
-            </a:r>
-            <a:r>
-              <a:rPr lang="es-MX" dirty="0" smtClean="0"/>
-              <a:t> </a:t>
-            </a:r>
-          </a:p>
-          <a:p>
-            <a:r>
-              <a:rPr lang="en-US" dirty="0" smtClean="0"/>
-              <a:t>POSTGRESQL</a:t>
-            </a:r>
-          </a:p>
-          <a:p>
-            <a:r>
-              <a:rPr lang="en-US" dirty="0" smtClean="0">
-                <a:hlinkClick r:id="rId3"/>
+              <a:t>1. Instalar herramientas antes del taller.</a:t>
+            </a:r>
+          </a:p>
+          <a:p>
+            <a:pPr marL="0" lvl="1" indent="0">
+              <a:spcBef>
+                <a:spcPts val="1000"/>
+              </a:spcBef>
+              <a:buNone/>
+            </a:pPr>
+            <a:r>
+              <a:rPr lang="es-MX" sz="2000" dirty="0">
+                <a:latin typeface="Arial" panose="020B0604020202020204" pitchFamily="34" charset="0"/>
+                <a:cs typeface="Arial" panose="020B0604020202020204" pitchFamily="34" charset="0"/>
               </a:rPr>
-              <a:t>https://www.enterprisedb.com/downloads/postgres-postgresql-downloads</a:t>
-            </a:r>
-            <a:r>
-              <a:rPr lang="en-US" dirty="0" smtClean="0"/>
-              <a:t> </a:t>
-            </a:r>
-          </a:p>
-          <a:p>
-            <a:r>
-              <a:rPr lang="en-US" dirty="0" smtClean="0"/>
-              <a:t>GIT</a:t>
-            </a:r>
-          </a:p>
-          <a:p>
-            <a:r>
-              <a:rPr lang="en-US" dirty="0" smtClean="0">
-                <a:hlinkClick r:id="rId4"/>
+              <a:t>2. Conocimientos en comandos básicos de GIT (</a:t>
+            </a:r>
+            <a:r>
+              <a:rPr lang="es-MX" sz="2000" dirty="0" err="1">
+                <a:latin typeface="Arial" panose="020B0604020202020204" pitchFamily="34" charset="0"/>
+                <a:cs typeface="Arial" panose="020B0604020202020204" pitchFamily="34" charset="0"/>
               </a:rPr>
-              <a:t>https://git-scm.com/</a:t>
-            </a:r>
-            <a:r>
-              <a:rPr lang="en-US" dirty="0" smtClean="0"/>
-              <a:t> </a:t>
+              <a:t>add</a:t>
+            </a:r>
+            <a:r>
+              <a:rPr lang="es-MX" sz="2000" dirty="0">
+                <a:latin typeface="Arial" panose="020B0604020202020204" pitchFamily="34" charset="0"/>
+                <a:cs typeface="Arial" panose="020B0604020202020204" pitchFamily="34" charset="0"/>
+              </a:rPr>
+              <a:t>, </a:t>
+            </a:r>
+            <a:r>
+              <a:rPr lang="es-MX" sz="2000" dirty="0" err="1">
+                <a:latin typeface="Arial" panose="020B0604020202020204" pitchFamily="34" charset="0"/>
+                <a:cs typeface="Arial" panose="020B0604020202020204" pitchFamily="34" charset="0"/>
+              </a:rPr>
+              <a:t>push</a:t>
+            </a:r>
+            <a:r>
+              <a:rPr lang="es-MX" sz="2000" dirty="0">
+                <a:latin typeface="Arial" panose="020B0604020202020204" pitchFamily="34" charset="0"/>
+                <a:cs typeface="Arial" panose="020B0604020202020204" pitchFamily="34" charset="0"/>
+              </a:rPr>
+              <a:t>, </a:t>
+            </a:r>
+            <a:r>
+              <a:rPr lang="es-MX" sz="2000" dirty="0" err="1">
+                <a:latin typeface="Arial" panose="020B0604020202020204" pitchFamily="34" charset="0"/>
+                <a:cs typeface="Arial" panose="020B0604020202020204" pitchFamily="34" charset="0"/>
+              </a:rPr>
+              <a:t>pull</a:t>
+            </a:r>
+            <a:r>
+              <a:rPr lang="es-MX" sz="2000" dirty="0">
+                <a:latin typeface="Arial" panose="020B0604020202020204" pitchFamily="34" charset="0"/>
+                <a:cs typeface="Arial" panose="020B0604020202020204" pitchFamily="34" charset="0"/>
+              </a:rPr>
+              <a:t>, </a:t>
+            </a:r>
+            <a:r>
+              <a:rPr lang="es-MX" sz="2000" dirty="0" err="1">
+                <a:latin typeface="Arial" panose="020B0604020202020204" pitchFamily="34" charset="0"/>
+                <a:cs typeface="Arial" panose="020B0604020202020204" pitchFamily="34" charset="0"/>
+              </a:rPr>
+              <a:t>commit</a:t>
+            </a:r>
+            <a:r>
+              <a:rPr lang="es-MX" sz="2000" dirty="0">
+                <a:latin typeface="Arial" panose="020B0604020202020204" pitchFamily="34" charset="0"/>
+                <a:cs typeface="Arial" panose="020B0604020202020204" pitchFamily="34" charset="0"/>
+              </a:rPr>
+              <a:t>).</a:t>
+            </a:r>
+          </a:p>
+          <a:p>
+            <a:pPr marL="0" indent="0">
+              <a:buNone/>
+            </a:pPr>
+            <a:r>
+              <a:rPr lang="es-MX" sz="2000" dirty="0">
+                <a:latin typeface="Arial"/>
+                <a:cs typeface="Arial"/>
+              </a:rPr>
+              <a:t>3. Conocimientos de lenguaje DML.</a:t>
+            </a:r>
+          </a:p>
+          <a:p>
+            <a:pPr marL="0" indent="0">
+              <a:buNone/>
+            </a:pPr>
+            <a:r>
+              <a:rPr lang="es-MX" sz="2000" dirty="0">
+                <a:latin typeface="Arial" panose="020B0604020202020204" pitchFamily="34" charset="0"/>
+                <a:cs typeface="Arial" panose="020B0604020202020204" pitchFamily="34" charset="0"/>
+              </a:rPr>
+              <a:t>4. Conocimientos básicos en JavaScript.</a:t>
             </a:r>
             <a:endParaRPr lang="en-US" dirty="0"/>
           </a:p>
           <a:p>
-            <a:r>
-              <a:rPr lang="en-US" dirty="0" smtClean="0"/>
-              <a:t>Visual studio code</a:t>
-            </a:r>
-          </a:p>
-          <a:p>
-            <a:r>
-              <a:rPr lang="en-US" dirty="0" smtClean="0">
-                <a:hlinkClick r:id="rId5"/>
+            <a:pPr marL="0" lvl="1" indent="0">
+              <a:spcBef>
+                <a:spcPts val="1000"/>
+              </a:spcBef>
+              <a:buNone/>
+            </a:pPr>
+            <a:r>
+              <a:rPr lang="es-MX" sz="2000" dirty="0">
+                <a:latin typeface="Arial" panose="020B0604020202020204" pitchFamily="34" charset="0"/>
+                <a:cs typeface="Arial" panose="020B0604020202020204" pitchFamily="34" charset="0"/>
               </a:rPr>
-              <a:t>https://code.visualstudio.com/download</a:t>
-            </a:r>
-            <a:r>
-              <a:rPr lang="en-US" dirty="0" smtClean="0"/>
-              <a:t> </a:t>
-            </a:r>
-          </a:p>
-          <a:p>
-            <a:r>
-              <a:rPr lang="es-MX" dirty="0" smtClean="0"/>
-              <a:t>POSTMAN </a:t>
-            </a:r>
-          </a:p>
-          <a:p>
-            <a:r>
-              <a:rPr lang="es-MX" dirty="0">
-                <a:hlinkClick r:id="rId6"/>
+              <a:t>Opcional:</a:t>
+            </a:r>
+          </a:p>
+          <a:p>
+            <a:pPr marL="0" lvl="1" indent="0">
+              <a:spcBef>
+                <a:spcPts val="1000"/>
+              </a:spcBef>
+              <a:buNone/>
+            </a:pPr>
+            <a:r>
+              <a:rPr lang="es-MX" sz="2000" dirty="0">
+                <a:latin typeface="Arial"/>
+                <a:cs typeface="Arial"/>
               </a:rPr>
-              <a:t>https://www.postman.com/downloads</a:t>
-            </a:r>
-            <a:r>
-              <a:rPr lang="es-MX" dirty="0" smtClean="0">
-                <a:hlinkClick r:id="rId6"/>
+              <a:t>Codificar el script del modelo de la base de datos que se encuentra en la carpeta “</a:t>
+            </a:r>
+            <a:r>
+              <a:rPr lang="es-MX" sz="2000" dirty="0" err="1">
+                <a:latin typeface="Arial"/>
+                <a:cs typeface="Arial"/>
               </a:rPr>
-              <a:t>/</a:t>
-            </a:r>
-            <a:r>
-              <a:rPr lang="es-MX" dirty="0" smtClean="0"/>
-              <a:t> </a:t>
-            </a:r>
-            <a:endParaRPr lang="es-MX" dirty="0" smtClean="0"/>
+              <a:t>basededatos</a:t>
+            </a:r>
+            <a:r>
+              <a:rPr lang="es-MX" sz="2000" dirty="0">
+                <a:latin typeface="Arial"/>
+                <a:cs typeface="Arial"/>
+              </a:rPr>
+              <a:t>” del repositorio.</a:t>
+            </a:r>
+          </a:p>
+          <a:p>
+            <a:pPr marL="0" lvl="1" indent="0">
+              <a:spcBef>
+                <a:spcPts val="1000"/>
+              </a:spcBef>
+              <a:buNone/>
+            </a:pPr>
+            <a:r>
+              <a:rPr lang="es-MX" sz="2000" dirty="0">
+                <a:latin typeface="Arial"/>
+                <a:cs typeface="Arial"/>
+              </a:rPr>
+              <a:t>Nota: Todo esto se vera en el taller, pero se recomienda estar familiarizado con los temas.</a:t>
+            </a:r>
+            <a:endParaRPr lang="es-MX" dirty="0"/>
           </a:p>
           <a:p>
             <a:pPr marL="0" indent="0">
               <a:buNone/>
             </a:pPr>
-            <a:endParaRPr lang="es-MX" dirty="0"/>
+            <a:endParaRPr lang="es-MX" sz="2000" dirty="0">
+              <a:latin typeface="Arial" panose="020B0604020202020204" pitchFamily="34" charset="0"/>
+              <a:cs typeface="Arial" panose="020B0604020202020204" pitchFamily="34" charset="0"/>
+            </a:endParaRPr>
           </a:p>
         </p:txBody>
       </p:sp>
     </p:spTree>
     <p:extLst>
       <p:ext uri="{BB962C8B-B14F-4D97-AF65-F5344CB8AC3E}">
-        <p14:creationId xmlns:p14="http://schemas.microsoft.com/office/powerpoint/2010/main" val="1143618442"/>
+        <p14:creationId xmlns:p14="http://schemas.microsoft.com/office/powerpoint/2010/main" val="3041236276"/>
       </p:ext>
     </p:extLst>
   </p:cSld>
   <p:clrMapOvr>
     <a:masterClrMapping/>
   </p:clrMapOvr>
-  <p:timing>
-    <p:tnLst>
-      <p:par>
-        <p:cTn id="1" dur="indefinite" restart="never" nodeType="tmRoot"/>
-      </p:par>
-    </p:tnLst>
-  </p:timing>
 </p:sld>
 </file>
 
@@ -4703,7 +4773,87 @@
           <a:bodyPr/>
           <a:lstStyle/>
           <a:p>
+            <a:r>
+              <a:rPr lang="es-MX" dirty="0"/>
+              <a:t>Objetivo del taller</a:t>
+            </a:r>
+          </a:p>
+        </p:txBody>
+      </p:sp>
+      <p:sp>
+        <p:nvSpPr>
+          <p:cNvPr id="3" name="Marcador de contenido 2"/>
+          <p:cNvSpPr>
+            <a:spLocks noGrp="1"/>
+          </p:cNvSpPr>
+          <p:nvPr>
+            <p:ph idx="1"/>
+          </p:nvPr>
+        </p:nvSpPr>
+        <p:spPr/>
+        <p:txBody>
+          <a:bodyPr/>
+          <a:lstStyle/>
+          <a:p>
+            <a:r>
+              <a:rPr lang="es-MX" dirty="0"/>
+              <a:t>Desarrollas las operaciones CRUD en una base de datos POSTGRESQL a través de un servicio REST codificado en NODE JS. </a:t>
+            </a:r>
+          </a:p>
+          <a:p>
             <a:endParaRPr lang="es-MX" dirty="0"/>
+          </a:p>
+        </p:txBody>
+      </p:sp>
+    </p:spTree>
+    <p:extLst>
+      <p:ext uri="{BB962C8B-B14F-4D97-AF65-F5344CB8AC3E}">
+        <p14:creationId xmlns:p14="http://schemas.microsoft.com/office/powerpoint/2010/main" val="1720955791"/>
+      </p:ext>
+    </p:extLst>
+  </p:cSld>
+  <p:clrMapOvr>
+    <a:masterClrMapping/>
+  </p:clrMapOvr>
+</p:sld>
+</file>
+
+<file path=ppt/slides/slide6.xml><?xml version="1.0" encoding="utf-8"?>
+<p:sld xmlns:a="http://schemas.openxmlformats.org/drawingml/2006/main" xmlns:r="http://schemas.openxmlformats.org/officeDocument/2006/relationships" xmlns:p="http://schemas.openxmlformats.org/presentationml/2006/main">
+  <p:cSld>
+    <p:spTree>
+      <p:nvGrpSpPr>
+        <p:cNvPr id="1" name=""/>
+        <p:cNvGrpSpPr/>
+        <p:nvPr/>
+      </p:nvGrpSpPr>
+      <p:grpSpPr>
+        <a:xfrm>
+          <a:off x="0" y="0"/>
+          <a:ext cx="0" cy="0"/>
+          <a:chOff x="0" y="0"/>
+          <a:chExt cx="0" cy="0"/>
+        </a:xfrm>
+      </p:grpSpPr>
+      <p:sp>
+        <p:nvSpPr>
+          <p:cNvPr id="2" name="Título 1"/>
+          <p:cNvSpPr>
+            <a:spLocks noGrp="1"/>
+          </p:cNvSpPr>
+          <p:nvPr>
+            <p:ph type="title"/>
+          </p:nvPr>
+        </p:nvSpPr>
+        <p:spPr/>
+        <p:txBody>
+          <a:bodyPr/>
+          <a:lstStyle/>
+          <a:p>
+            <a:r>
+              <a:rPr lang="es-MX" dirty="0"/>
+              <a:t>Que sigue…</a:t>
+            </a:r>
           </a:p>
         </p:txBody>
       </p:sp>
@@ -4725,10 +4875,15 @@
           <a:lstStyle/>
           <a:p>
             <a:r>
-              <a:rPr lang="es-MX" sz="2000" dirty="0" smtClean="0"/>
-              <a:t>Nos escuchamos el 23 de marzo</a:t>
-            </a:r>
-            <a:endParaRPr lang="es-MX" sz="2000" dirty="0"/>
+              <a:rPr lang="es-MX" sz="2000" dirty="0"/>
+              <a:t>Nos escuchamos el 23 de marzo.</a:t>
+            </a:r>
+          </a:p>
+          <a:p>
+            <a:r>
+              <a:rPr lang="es-MX" sz="2000" dirty="0"/>
+              <a:t>En un horario de 9:00-14:00 horas.</a:t>
+            </a:r>
           </a:p>
         </p:txBody>
       </p:sp>
@@ -4742,13 +4897,6 @@
   <p:clrMapOvr>
     <a:masterClrMapping/>
   </p:clrMapOvr>
-  <p:timing>
-    <p:tnLst>
-      <p:par>
-        <p:cTn id="1" dur="indefinite" restart="never" nodeType="tmRoot"/>
-      </p:par>
-    </p:tnLst>
-  </p:timing>
 </p:sld>
 </file>
 

</xml_diff>